<commit_message>
Changes to docx and pptx
</commit_message>
<xml_diff>
--- a/Презентация_лабораторная_Интерпретатор_Загрядсков_Максим_Болтенков_Станислав_3823Б1ПМ1_1.pptx
+++ b/Презентация_лабораторная_Интерпретатор_Загрядсков_Максим_Болтенков_Станислав_3823Б1ПМ1_1.pptx
@@ -1659,6 +1659,13 @@
         </dgm:presLayoutVars>
       </dgm:prSet>
       <dgm:spPr/>
+      <dgm:t>
+        <a:bodyPr/>
+        <a:lstStyle/>
+        <a:p>
+          <a:endParaRPr lang="ru-RU"/>
+        </a:p>
+      </dgm:t>
     </dgm:pt>
     <dgm:pt modelId="{2C61CDB8-1126-4D10-8A0C-A887CB36E88D}" type="pres">
       <dgm:prSet presAssocID="{F0375D81-EA31-407D-9450-A8FE664209E9}" presName="textCenter" presStyleLbl="node1" presStyleIdx="0" presStyleCnt="15" custScaleX="42874" custScaleY="42874" custLinFactNeighborX="6678" custLinFactNeighborY="4202"/>
@@ -1667,6 +1674,13 @@
           <a:avLst/>
         </a:prstGeom>
       </dgm:spPr>
+      <dgm:t>
+        <a:bodyPr/>
+        <a:lstStyle/>
+        <a:p>
+          <a:endParaRPr lang="ru-RU"/>
+        </a:p>
+      </dgm:t>
     </dgm:pt>
     <dgm:pt modelId="{99162502-7E36-4BA7-BFCB-D56C5DFB7F09}" type="pres">
       <dgm:prSet presAssocID="{F0375D81-EA31-407D-9450-A8FE664209E9}" presName="cycle_1" presStyleCnt="0"/>
@@ -1679,10 +1693,24 @@
           <a:avLst/>
         </a:prstGeom>
       </dgm:spPr>
+      <dgm:t>
+        <a:bodyPr/>
+        <a:lstStyle/>
+        <a:p>
+          <a:endParaRPr lang="ru-RU"/>
+        </a:p>
+      </dgm:t>
     </dgm:pt>
     <dgm:pt modelId="{14F8E73C-F36A-45CB-BFCE-4B2564C5D8DB}" type="pres">
       <dgm:prSet presAssocID="{9479EB3C-A16E-462A-828B-D51E498566EE}" presName="Name141" presStyleLbl="parChTrans1D3" presStyleIdx="0" presStyleCnt="10"/>
       <dgm:spPr/>
+      <dgm:t>
+        <a:bodyPr/>
+        <a:lstStyle/>
+        <a:p>
+          <a:endParaRPr lang="ru-RU"/>
+        </a:p>
+      </dgm:t>
     </dgm:pt>
     <dgm:pt modelId="{131FDBC9-C4E8-4D45-8ABB-A1AFD43B00EC}" type="pres">
       <dgm:prSet presAssocID="{71417C9C-41D5-467E-9678-7E5EF1DEAA64}" presName="text1" presStyleLbl="node1" presStyleIdx="2" presStyleCnt="15" custScaleX="63991" custScaleY="63991" custRadScaleRad="177803" custRadScaleInc="47732">
@@ -1695,10 +1723,24 @@
           <a:avLst/>
         </a:prstGeom>
       </dgm:spPr>
+      <dgm:t>
+        <a:bodyPr/>
+        <a:lstStyle/>
+        <a:p>
+          <a:endParaRPr lang="ru-RU"/>
+        </a:p>
+      </dgm:t>
     </dgm:pt>
     <dgm:pt modelId="{D798D8B1-4DD5-4F76-A915-4D9BC4A9F7BC}" type="pres">
       <dgm:prSet presAssocID="{511F46B2-9729-40F5-A774-4D9C08F18E83}" presName="Name144" presStyleLbl="parChTrans1D2" presStyleIdx="0" presStyleCnt="4"/>
       <dgm:spPr/>
+      <dgm:t>
+        <a:bodyPr/>
+        <a:lstStyle/>
+        <a:p>
+          <a:endParaRPr lang="ru-RU"/>
+        </a:p>
+      </dgm:t>
     </dgm:pt>
     <dgm:pt modelId="{78DF4324-BEBD-4C20-8662-1460A63AEC61}" type="pres">
       <dgm:prSet presAssocID="{F0375D81-EA31-407D-9450-A8FE664209E9}" presName="cycle_2" presStyleCnt="0"/>
@@ -1711,10 +1753,24 @@
           <a:avLst/>
         </a:prstGeom>
       </dgm:spPr>
+      <dgm:t>
+        <a:bodyPr/>
+        <a:lstStyle/>
+        <a:p>
+          <a:endParaRPr lang="ru-RU"/>
+        </a:p>
+      </dgm:t>
     </dgm:pt>
     <dgm:pt modelId="{13C6C64B-B032-4BA4-83DB-6A35EE2DAC82}" type="pres">
       <dgm:prSet presAssocID="{E7D2329F-9681-4125-A514-37240D313997}" presName="Name218" presStyleLbl="parChTrans1D3" presStyleIdx="1" presStyleCnt="10"/>
       <dgm:spPr/>
+      <dgm:t>
+        <a:bodyPr/>
+        <a:lstStyle/>
+        <a:p>
+          <a:endParaRPr lang="ru-RU"/>
+        </a:p>
+      </dgm:t>
     </dgm:pt>
     <dgm:pt modelId="{60645163-21D0-4CD5-9FB8-587A220A1664}" type="pres">
       <dgm:prSet presAssocID="{76CD3A94-BB58-4E79-AE04-950749E90406}" presName="text2" presStyleLbl="node1" presStyleIdx="4" presStyleCnt="15" custScaleX="63991" custScaleY="63991" custRadScaleRad="200428" custRadScaleInc="115496">
@@ -1727,10 +1783,24 @@
           <a:avLst/>
         </a:prstGeom>
       </dgm:spPr>
+      <dgm:t>
+        <a:bodyPr/>
+        <a:lstStyle/>
+        <a:p>
+          <a:endParaRPr lang="ru-RU"/>
+        </a:p>
+      </dgm:t>
     </dgm:pt>
     <dgm:pt modelId="{F1052044-0FDD-422D-B472-4653C35157C6}" type="pres">
       <dgm:prSet presAssocID="{032E0D3E-E48E-4E6A-BD8A-5430FC59272E}" presName="Name218" presStyleLbl="parChTrans1D3" presStyleIdx="2" presStyleCnt="10"/>
       <dgm:spPr/>
+      <dgm:t>
+        <a:bodyPr/>
+        <a:lstStyle/>
+        <a:p>
+          <a:endParaRPr lang="ru-RU"/>
+        </a:p>
+      </dgm:t>
     </dgm:pt>
     <dgm:pt modelId="{87EB7461-B202-41C3-B18F-A0F3E6601857}" type="pres">
       <dgm:prSet presAssocID="{F3387FD0-03C2-49E7-BC48-23BCF1C821D1}" presName="text2" presStyleLbl="node1" presStyleIdx="5" presStyleCnt="15" custScaleX="63991" custScaleY="63991" custRadScaleRad="237589" custRadScaleInc="-55823">
@@ -1743,10 +1813,24 @@
           <a:avLst/>
         </a:prstGeom>
       </dgm:spPr>
+      <dgm:t>
+        <a:bodyPr/>
+        <a:lstStyle/>
+        <a:p>
+          <a:endParaRPr lang="ru-RU"/>
+        </a:p>
+      </dgm:t>
     </dgm:pt>
     <dgm:pt modelId="{2CB8979D-EB12-4FD7-823E-E18C29F26A6C}" type="pres">
       <dgm:prSet presAssocID="{E57571B8-76B3-4DBD-AB12-62351466A144}" presName="Name218" presStyleLbl="parChTrans1D3" presStyleIdx="3" presStyleCnt="10"/>
       <dgm:spPr/>
+      <dgm:t>
+        <a:bodyPr/>
+        <a:lstStyle/>
+        <a:p>
+          <a:endParaRPr lang="ru-RU"/>
+        </a:p>
+      </dgm:t>
     </dgm:pt>
     <dgm:pt modelId="{E2CE3FDF-1297-4411-9D78-44A8932D4D01}" type="pres">
       <dgm:prSet presAssocID="{256FEE81-9056-4F41-86E9-A87A2826DE9D}" presName="text2" presStyleLbl="node1" presStyleIdx="6" presStyleCnt="15" custScaleX="63991" custScaleY="63991" custRadScaleRad="236509" custRadScaleInc="-58019">
@@ -1759,10 +1843,24 @@
           <a:avLst/>
         </a:prstGeom>
       </dgm:spPr>
+      <dgm:t>
+        <a:bodyPr/>
+        <a:lstStyle/>
+        <a:p>
+          <a:endParaRPr lang="ru-RU"/>
+        </a:p>
+      </dgm:t>
     </dgm:pt>
     <dgm:pt modelId="{45DBFF19-4A76-4533-998B-AE2989807EE3}" type="pres">
       <dgm:prSet presAssocID="{806EBB18-A966-4973-8080-268AF4E6D478}" presName="Name221" presStyleLbl="parChTrans1D2" presStyleIdx="1" presStyleCnt="4"/>
       <dgm:spPr/>
+      <dgm:t>
+        <a:bodyPr/>
+        <a:lstStyle/>
+        <a:p>
+          <a:endParaRPr lang="ru-RU"/>
+        </a:p>
+      </dgm:t>
     </dgm:pt>
     <dgm:pt modelId="{8E41373E-6E8B-4736-80B3-0F53DD1D4DC9}" type="pres">
       <dgm:prSet presAssocID="{F0375D81-EA31-407D-9450-A8FE664209E9}" presName="cycle_3" presStyleCnt="0"/>
@@ -1775,10 +1873,24 @@
           <a:avLst/>
         </a:prstGeom>
       </dgm:spPr>
+      <dgm:t>
+        <a:bodyPr/>
+        <a:lstStyle/>
+        <a:p>
+          <a:endParaRPr lang="ru-RU"/>
+        </a:p>
+      </dgm:t>
     </dgm:pt>
     <dgm:pt modelId="{C78F9FD8-1B2A-4A2C-98A7-59E90813D8F9}" type="pres">
       <dgm:prSet presAssocID="{762F0E84-B23A-4091-8901-A78F7AE85B75}" presName="Name285" presStyleLbl="parChTrans1D3" presStyleIdx="4" presStyleCnt="10"/>
       <dgm:spPr/>
+      <dgm:t>
+        <a:bodyPr/>
+        <a:lstStyle/>
+        <a:p>
+          <a:endParaRPr lang="ru-RU"/>
+        </a:p>
+      </dgm:t>
     </dgm:pt>
     <dgm:pt modelId="{3CB765B0-9F03-4E47-81C1-10013D386D00}" type="pres">
       <dgm:prSet presAssocID="{328C0A48-268C-4B41-ABB7-6DDF12D715AC}" presName="text3" presStyleLbl="node1" presStyleIdx="8" presStyleCnt="15" custScaleX="63991" custScaleY="63991" custRadScaleRad="119613" custRadScaleInc="148155">
@@ -1791,10 +1903,24 @@
           <a:avLst/>
         </a:prstGeom>
       </dgm:spPr>
+      <dgm:t>
+        <a:bodyPr/>
+        <a:lstStyle/>
+        <a:p>
+          <a:endParaRPr lang="ru-RU"/>
+        </a:p>
+      </dgm:t>
     </dgm:pt>
     <dgm:pt modelId="{7C261A88-DCC1-402A-8F6D-218D973FCEBC}" type="pres">
       <dgm:prSet presAssocID="{3E9E04D1-1302-4E1A-AE3A-AABDBDF394A8}" presName="Name285" presStyleLbl="parChTrans1D3" presStyleIdx="5" presStyleCnt="10"/>
       <dgm:spPr/>
+      <dgm:t>
+        <a:bodyPr/>
+        <a:lstStyle/>
+        <a:p>
+          <a:endParaRPr lang="ru-RU"/>
+        </a:p>
+      </dgm:t>
     </dgm:pt>
     <dgm:pt modelId="{785EF704-5E01-4C5D-9B6C-C1A4F4F2BC65}" type="pres">
       <dgm:prSet presAssocID="{35747D65-C0E3-45F4-B29B-77F49AB95CCE}" presName="text3" presStyleLbl="node1" presStyleIdx="9" presStyleCnt="15" custScaleX="63991" custScaleY="63991" custRadScaleRad="134030" custRadScaleInc="-148353">
@@ -1807,10 +1933,24 @@
           <a:avLst/>
         </a:prstGeom>
       </dgm:spPr>
+      <dgm:t>
+        <a:bodyPr/>
+        <a:lstStyle/>
+        <a:p>
+          <a:endParaRPr lang="ru-RU"/>
+        </a:p>
+      </dgm:t>
     </dgm:pt>
     <dgm:pt modelId="{F9EF837E-131A-4176-A68D-F9B069662957}" type="pres">
       <dgm:prSet presAssocID="{0E9B778E-2EA7-4990-AB0C-12820DF4FB7A}" presName="Name288" presStyleLbl="parChTrans1D2" presStyleIdx="2" presStyleCnt="4"/>
       <dgm:spPr/>
+      <dgm:t>
+        <a:bodyPr/>
+        <a:lstStyle/>
+        <a:p>
+          <a:endParaRPr lang="ru-RU"/>
+        </a:p>
+      </dgm:t>
     </dgm:pt>
     <dgm:pt modelId="{F4E22CC6-2A33-4EDD-BC5E-E663A602C63E}" type="pres">
       <dgm:prSet presAssocID="{F0375D81-EA31-407D-9450-A8FE664209E9}" presName="cycle_4" presStyleCnt="0"/>
@@ -1823,10 +1963,24 @@
           <a:avLst/>
         </a:prstGeom>
       </dgm:spPr>
+      <dgm:t>
+        <a:bodyPr/>
+        <a:lstStyle/>
+        <a:p>
+          <a:endParaRPr lang="ru-RU"/>
+        </a:p>
+      </dgm:t>
     </dgm:pt>
     <dgm:pt modelId="{FDFA6494-C20A-4DF1-9EB1-15EC7E3D468F}" type="pres">
       <dgm:prSet presAssocID="{1C2F9CC8-896B-41B3-AF0F-84093C1E8121}" presName="Name342" presStyleLbl="parChTrans1D3" presStyleIdx="6" presStyleCnt="10"/>
       <dgm:spPr/>
+      <dgm:t>
+        <a:bodyPr/>
+        <a:lstStyle/>
+        <a:p>
+          <a:endParaRPr lang="ru-RU"/>
+        </a:p>
+      </dgm:t>
     </dgm:pt>
     <dgm:pt modelId="{36B922F0-8DD1-4CE5-9219-E2A03E341421}" type="pres">
       <dgm:prSet presAssocID="{9C91AE0B-CDBD-4C19-8B02-531F0A655388}" presName="text4" presStyleLbl="node1" presStyleIdx="11" presStyleCnt="15" custScaleX="85994" custScaleY="85994" custRadScaleRad="125783" custRadScaleInc="314883">
@@ -1839,10 +1993,24 @@
           <a:avLst/>
         </a:prstGeom>
       </dgm:spPr>
+      <dgm:t>
+        <a:bodyPr/>
+        <a:lstStyle/>
+        <a:p>
+          <a:endParaRPr lang="ru-RU"/>
+        </a:p>
+      </dgm:t>
     </dgm:pt>
     <dgm:pt modelId="{5CE3542D-079C-435F-B81F-B7EB2B4F5618}" type="pres">
       <dgm:prSet presAssocID="{0249E7AD-330C-42C9-9CF1-85C044344138}" presName="Name342" presStyleLbl="parChTrans1D3" presStyleIdx="7" presStyleCnt="10"/>
       <dgm:spPr/>
+      <dgm:t>
+        <a:bodyPr/>
+        <a:lstStyle/>
+        <a:p>
+          <a:endParaRPr lang="ru-RU"/>
+        </a:p>
+      </dgm:t>
     </dgm:pt>
     <dgm:pt modelId="{ECFDD823-6703-43A5-8158-FD4B0022F6F7}" type="pres">
       <dgm:prSet presAssocID="{DD5A8A72-D66B-4F22-BC00-3BEC12B711C3}" presName="text4" presStyleLbl="node1" presStyleIdx="12" presStyleCnt="15" custScaleX="85994" custScaleY="85994" custRadScaleRad="204775" custRadScaleInc="130512">
@@ -1855,10 +2023,24 @@
           <a:avLst/>
         </a:prstGeom>
       </dgm:spPr>
+      <dgm:t>
+        <a:bodyPr/>
+        <a:lstStyle/>
+        <a:p>
+          <a:endParaRPr lang="ru-RU"/>
+        </a:p>
+      </dgm:t>
     </dgm:pt>
     <dgm:pt modelId="{7791B2A8-52F3-432F-A09A-9EDE85E8DB98}" type="pres">
       <dgm:prSet presAssocID="{14C2A219-D87C-4A41-8355-454819345B24}" presName="Name342" presStyleLbl="parChTrans1D3" presStyleIdx="8" presStyleCnt="10"/>
       <dgm:spPr/>
+      <dgm:t>
+        <a:bodyPr/>
+        <a:lstStyle/>
+        <a:p>
+          <a:endParaRPr lang="ru-RU"/>
+        </a:p>
+      </dgm:t>
     </dgm:pt>
     <dgm:pt modelId="{BD0E00A4-B95A-437C-BF76-EB23C61FE4BE}" type="pres">
       <dgm:prSet presAssocID="{1735A180-4B3C-4FB2-95EB-B5F12D12B418}" presName="text4" presStyleLbl="node1" presStyleIdx="13" presStyleCnt="15" custScaleX="85994" custScaleY="85994" custRadScaleRad="165231" custRadScaleInc="-53070">
@@ -1871,10 +2053,24 @@
           <a:avLst/>
         </a:prstGeom>
       </dgm:spPr>
+      <dgm:t>
+        <a:bodyPr/>
+        <a:lstStyle/>
+        <a:p>
+          <a:endParaRPr lang="ru-RU"/>
+        </a:p>
+      </dgm:t>
     </dgm:pt>
     <dgm:pt modelId="{7B2776D1-F237-415E-A8BD-98ECE5B561A2}" type="pres">
       <dgm:prSet presAssocID="{D9B202E9-AE8C-40D2-A015-6D1E4380B06B}" presName="Name342" presStyleLbl="parChTrans1D3" presStyleIdx="9" presStyleCnt="10"/>
       <dgm:spPr/>
+      <dgm:t>
+        <a:bodyPr/>
+        <a:lstStyle/>
+        <a:p>
+          <a:endParaRPr lang="ru-RU"/>
+        </a:p>
+      </dgm:t>
     </dgm:pt>
     <dgm:pt modelId="{F7BC56CE-CBA1-4658-99B9-7FF4E78AF3A8}" type="pres">
       <dgm:prSet presAssocID="{BA0CE55D-B380-4A3F-92DC-95FBD2463EE0}" presName="text4" presStyleLbl="node1" presStyleIdx="14" presStyleCnt="15" custScaleX="85994" custScaleY="85994" custRadScaleRad="201657" custRadScaleInc="-227782">
@@ -1898,54 +2094,61 @@
     <dgm:pt modelId="{D1A3650F-8811-4F02-9044-88FB21A4BFCD}" type="pres">
       <dgm:prSet presAssocID="{E67B6AC2-E4BC-425A-90E5-90C0896AC2CC}" presName="Name345" presStyleLbl="parChTrans1D2" presStyleIdx="3" presStyleCnt="4"/>
       <dgm:spPr/>
+      <dgm:t>
+        <a:bodyPr/>
+        <a:lstStyle/>
+        <a:p>
+          <a:endParaRPr lang="ru-RU"/>
+        </a:p>
+      </dgm:t>
     </dgm:pt>
   </dgm:ptLst>
   <dgm:cxnLst>
+    <dgm:cxn modelId="{19A40656-4809-4667-AB31-70F262832267}" srcId="{F859983B-39FB-47E7-8C57-9DD8F40D1D9A}" destId="{F0375D81-EA31-407D-9450-A8FE664209E9}" srcOrd="0" destOrd="0" parTransId="{1B8994B9-1FA2-4BCC-B59E-DD923832FA9D}" sibTransId="{F8D3018F-5870-4E34-88B8-AEF8BD26787A}"/>
+    <dgm:cxn modelId="{3C65D324-0474-4D66-B1CD-2DA867734247}" type="presOf" srcId="{F3387FD0-03C2-49E7-BC48-23BCF1C821D1}" destId="{87EB7461-B202-41C3-B18F-A0F3E6601857}" srcOrd="0" destOrd="0" presId="urn:microsoft.com/office/officeart/2008/layout/RadialCluster"/>
+    <dgm:cxn modelId="{3DF00570-0EC5-437F-A53F-9BBD60A94D24}" type="presOf" srcId="{0E9B778E-2EA7-4990-AB0C-12820DF4FB7A}" destId="{F9EF837E-131A-4176-A68D-F9B069662957}" srcOrd="0" destOrd="0" presId="urn:microsoft.com/office/officeart/2008/layout/RadialCluster"/>
+    <dgm:cxn modelId="{8B9A5703-6E58-4332-9110-0C050385FBB6}" srcId="{A0DD1813-EB36-4B44-90D1-8D815D596B10}" destId="{1735A180-4B3C-4FB2-95EB-B5F12D12B418}" srcOrd="2" destOrd="0" parTransId="{14C2A219-D87C-4A41-8355-454819345B24}" sibTransId="{FAD1D1C0-A72C-4FD6-9D14-4CB9F8F9E9AC}"/>
+    <dgm:cxn modelId="{37CA5FA0-D83A-4F45-9093-7C70C2D6D688}" srcId="{A0DD1813-EB36-4B44-90D1-8D815D596B10}" destId="{9C91AE0B-CDBD-4C19-8B02-531F0A655388}" srcOrd="0" destOrd="0" parTransId="{1C2F9CC8-896B-41B3-AF0F-84093C1E8121}" sibTransId="{0605D182-E01E-4763-ABDC-9D1D920D3E73}"/>
+    <dgm:cxn modelId="{1AC44F4B-F912-4002-81FF-5C4B7E96BE01}" type="presOf" srcId="{032E0D3E-E48E-4E6A-BD8A-5430FC59272E}" destId="{F1052044-0FDD-422D-B472-4653C35157C6}" srcOrd="0" destOrd="0" presId="urn:microsoft.com/office/officeart/2008/layout/RadialCluster"/>
+    <dgm:cxn modelId="{3C409CBE-62E3-4F8D-A262-ABEA0AB53359}" type="presOf" srcId="{DD5A8A72-D66B-4F22-BC00-3BEC12B711C3}" destId="{ECFDD823-6703-43A5-8158-FD4B0022F6F7}" srcOrd="0" destOrd="0" presId="urn:microsoft.com/office/officeart/2008/layout/RadialCluster"/>
+    <dgm:cxn modelId="{1BE17BED-1E68-4B40-859A-85090FBE9549}" srcId="{F0375D81-EA31-407D-9450-A8FE664209E9}" destId="{A0DD1813-EB36-4B44-90D1-8D815D596B10}" srcOrd="3" destOrd="0" parTransId="{E67B6AC2-E4BC-425A-90E5-90C0896AC2CC}" sibTransId="{4448D2A1-ABB7-4D3E-984F-DC9ED42CD75D}"/>
+    <dgm:cxn modelId="{631D0338-F35F-4ECB-805F-F1B15002CCE4}" type="presOf" srcId="{E57571B8-76B3-4DBD-AB12-62351466A144}" destId="{2CB8979D-EB12-4FD7-823E-E18C29F26A6C}" srcOrd="0" destOrd="0" presId="urn:microsoft.com/office/officeart/2008/layout/RadialCluster"/>
+    <dgm:cxn modelId="{5609F472-8643-42B0-967A-5B44CD237455}" type="presOf" srcId="{A899F7D4-A4FB-438D-8EE9-50E475B215B7}" destId="{26DAB9AD-417E-4638-A432-60D1AD968EEE}" srcOrd="0" destOrd="0" presId="urn:microsoft.com/office/officeart/2008/layout/RadialCluster"/>
+    <dgm:cxn modelId="{123B033F-E9A5-4B8F-8778-AEA0E5662BE5}" type="presOf" srcId="{D9B202E9-AE8C-40D2-A015-6D1E4380B06B}" destId="{7B2776D1-F237-415E-A8BD-98ECE5B561A2}" srcOrd="0" destOrd="0" presId="urn:microsoft.com/office/officeart/2008/layout/RadialCluster"/>
+    <dgm:cxn modelId="{6C82ACCC-4F75-4318-9654-105491425942}" srcId="{F0375D81-EA31-407D-9450-A8FE664209E9}" destId="{A899F7D4-A4FB-438D-8EE9-50E475B215B7}" srcOrd="0" destOrd="0" parTransId="{511F46B2-9729-40F5-A774-4D9C08F18E83}" sibTransId="{FB54FE33-EE5B-404B-9C7C-A4B629952FAC}"/>
+    <dgm:cxn modelId="{44E8498D-CDEC-4CE8-A64C-DCBB2A8ED9A8}" type="presOf" srcId="{1735A180-4B3C-4FB2-95EB-B5F12D12B418}" destId="{BD0E00A4-B95A-437C-BF76-EB23C61FE4BE}" srcOrd="0" destOrd="0" presId="urn:microsoft.com/office/officeart/2008/layout/RadialCluster"/>
+    <dgm:cxn modelId="{BBB42A01-97D0-426E-8FB9-47FC2C033C25}" type="presOf" srcId="{35747D65-C0E3-45F4-B29B-77F49AB95CCE}" destId="{785EF704-5E01-4C5D-9B6C-C1A4F4F2BC65}" srcOrd="0" destOrd="0" presId="urn:microsoft.com/office/officeart/2008/layout/RadialCluster"/>
+    <dgm:cxn modelId="{D3A9AB68-7564-493B-8836-765DDD3E7691}" type="presOf" srcId="{762F0E84-B23A-4091-8901-A78F7AE85B75}" destId="{C78F9FD8-1B2A-4A2C-98A7-59E90813D8F9}" srcOrd="0" destOrd="0" presId="urn:microsoft.com/office/officeart/2008/layout/RadialCluster"/>
+    <dgm:cxn modelId="{E65196B1-7248-4E81-9AE9-E06B4A11E01D}" srcId="{B4383D45-2EB5-431F-9E3B-61E0E61EA173}" destId="{76CD3A94-BB58-4E79-AE04-950749E90406}" srcOrd="0" destOrd="0" parTransId="{E7D2329F-9681-4125-A514-37240D313997}" sibTransId="{49F38F2D-846A-4AC9-A999-45F52BEB83E6}"/>
+    <dgm:cxn modelId="{282DDE30-BF8C-474A-9509-1C7DF5018B8C}" type="presOf" srcId="{0249E7AD-330C-42C9-9CF1-85C044344138}" destId="{5CE3542D-079C-435F-B81F-B7EB2B4F5618}" srcOrd="0" destOrd="0" presId="urn:microsoft.com/office/officeart/2008/layout/RadialCluster"/>
+    <dgm:cxn modelId="{6E0BF7DF-3B64-49DB-89DA-4F8E0A433A24}" type="presOf" srcId="{A0DD1813-EB36-4B44-90D1-8D815D596B10}" destId="{11A06565-916D-439F-9911-EA567A860001}" srcOrd="0" destOrd="0" presId="urn:microsoft.com/office/officeart/2008/layout/RadialCluster"/>
+    <dgm:cxn modelId="{4FBAF1D3-BBC6-4C17-B0B3-61B392007395}" srcId="{F0375D81-EA31-407D-9450-A8FE664209E9}" destId="{B4383D45-2EB5-431F-9E3B-61E0E61EA173}" srcOrd="1" destOrd="0" parTransId="{806EBB18-A966-4973-8080-268AF4E6D478}" sibTransId="{3868CC5F-FB5D-4E2B-9183-84D4EF55EAB2}"/>
     <dgm:cxn modelId="{D26FB8A9-A4E5-4A14-927D-6BE296AD34D8}" type="presOf" srcId="{71417C9C-41D5-467E-9678-7E5EF1DEAA64}" destId="{131FDBC9-C4E8-4D45-8ABB-A1AFD43B00EC}" srcOrd="0" destOrd="0" presId="urn:microsoft.com/office/officeart/2008/layout/RadialCluster"/>
-    <dgm:cxn modelId="{3DF00570-0EC5-437F-A53F-9BBD60A94D24}" type="presOf" srcId="{0E9B778E-2EA7-4990-AB0C-12820DF4FB7A}" destId="{F9EF837E-131A-4176-A68D-F9B069662957}" srcOrd="0" destOrd="0" presId="urn:microsoft.com/office/officeart/2008/layout/RadialCluster"/>
-    <dgm:cxn modelId="{3C409CBE-62E3-4F8D-A262-ABEA0AB53359}" type="presOf" srcId="{DD5A8A72-D66B-4F22-BC00-3BEC12B711C3}" destId="{ECFDD823-6703-43A5-8158-FD4B0022F6F7}" srcOrd="0" destOrd="0" presId="urn:microsoft.com/office/officeart/2008/layout/RadialCluster"/>
-    <dgm:cxn modelId="{37CA5FA0-D83A-4F45-9093-7C70C2D6D688}" srcId="{A0DD1813-EB36-4B44-90D1-8D815D596B10}" destId="{9C91AE0B-CDBD-4C19-8B02-531F0A655388}" srcOrd="0" destOrd="0" parTransId="{1C2F9CC8-896B-41B3-AF0F-84093C1E8121}" sibTransId="{0605D182-E01E-4763-ABDC-9D1D920D3E73}"/>
-    <dgm:cxn modelId="{5609F472-8643-42B0-967A-5B44CD237455}" type="presOf" srcId="{A899F7D4-A4FB-438D-8EE9-50E475B215B7}" destId="{26DAB9AD-417E-4638-A432-60D1AD968EEE}" srcOrd="0" destOrd="0" presId="urn:microsoft.com/office/officeart/2008/layout/RadialCluster"/>
+    <dgm:cxn modelId="{923EE879-5E5C-4AC5-AF48-B703EE09B99B}" srcId="{A899F7D4-A4FB-438D-8EE9-50E475B215B7}" destId="{71417C9C-41D5-467E-9678-7E5EF1DEAA64}" srcOrd="0" destOrd="0" parTransId="{9479EB3C-A16E-462A-828B-D51E498566EE}" sibTransId="{CC466F42-389B-45F4-9AE2-3F446F36D922}"/>
+    <dgm:cxn modelId="{F2CF1DE7-0B47-420F-9398-2992DC3DFB6B}" srcId="{BBCF9853-183B-4BF0-86E7-F45030B3E232}" destId="{328C0A48-268C-4B41-ABB7-6DDF12D715AC}" srcOrd="0" destOrd="0" parTransId="{762F0E84-B23A-4091-8901-A78F7AE85B75}" sibTransId="{5CE6F0E9-D2D4-4DBF-A420-B59D5889D7C4}"/>
     <dgm:cxn modelId="{F85F1A8F-3B09-45AC-9E9B-439C92015CFF}" type="presOf" srcId="{BBCF9853-183B-4BF0-86E7-F45030B3E232}" destId="{D67A4FBC-EAA1-4D29-BD12-2A72C4D31151}" srcOrd="0" destOrd="0" presId="urn:microsoft.com/office/officeart/2008/layout/RadialCluster"/>
-    <dgm:cxn modelId="{9D196EFC-914A-4B9C-8335-EA474951B02D}" type="presOf" srcId="{F0375D81-EA31-407D-9450-A8FE664209E9}" destId="{2C61CDB8-1126-4D10-8A0C-A887CB36E88D}" srcOrd="0" destOrd="0" presId="urn:microsoft.com/office/officeart/2008/layout/RadialCluster"/>
-    <dgm:cxn modelId="{9D7A167B-95AA-4E1E-B3D9-F736BBA066E2}" srcId="{B4383D45-2EB5-431F-9E3B-61E0E61EA173}" destId="{F3387FD0-03C2-49E7-BC48-23BCF1C821D1}" srcOrd="1" destOrd="0" parTransId="{032E0D3E-E48E-4E6A-BD8A-5430FC59272E}" sibTransId="{5CFBA39C-DAD5-47F7-A30E-1AB44EB4E519}"/>
-    <dgm:cxn modelId="{88C0B63A-1A7B-4639-A910-F3D271A6B105}" type="presOf" srcId="{1C2F9CC8-896B-41B3-AF0F-84093C1E8121}" destId="{FDFA6494-C20A-4DF1-9EB1-15EC7E3D468F}" srcOrd="0" destOrd="0" presId="urn:microsoft.com/office/officeart/2008/layout/RadialCluster"/>
-    <dgm:cxn modelId="{9F1C99D9-6977-4CBF-933F-2F3617748478}" type="presOf" srcId="{9479EB3C-A16E-462A-828B-D51E498566EE}" destId="{14F8E73C-F36A-45CB-BFCE-4B2564C5D8DB}" srcOrd="0" destOrd="0" presId="urn:microsoft.com/office/officeart/2008/layout/RadialCluster"/>
-    <dgm:cxn modelId="{E65196B1-7248-4E81-9AE9-E06B4A11E01D}" srcId="{B4383D45-2EB5-431F-9E3B-61E0E61EA173}" destId="{76CD3A94-BB58-4E79-AE04-950749E90406}" srcOrd="0" destOrd="0" parTransId="{E7D2329F-9681-4125-A514-37240D313997}" sibTransId="{49F38F2D-846A-4AC9-A999-45F52BEB83E6}"/>
-    <dgm:cxn modelId="{BDF3C253-909D-447A-AFF0-FB66AF70313E}" srcId="{A0DD1813-EB36-4B44-90D1-8D815D596B10}" destId="{DD5A8A72-D66B-4F22-BC00-3BEC12B711C3}" srcOrd="1" destOrd="0" parTransId="{0249E7AD-330C-42C9-9CF1-85C044344138}" sibTransId="{2ADC5E6A-35B0-4E8C-8EE9-7F0314B6476D}"/>
     <dgm:cxn modelId="{40EB6C09-672D-488A-8E51-3BEDF368D54F}" type="presOf" srcId="{14C2A219-D87C-4A41-8355-454819345B24}" destId="{7791B2A8-52F3-432F-A09A-9EDE85E8DB98}" srcOrd="0" destOrd="0" presId="urn:microsoft.com/office/officeart/2008/layout/RadialCluster"/>
-    <dgm:cxn modelId="{631D0338-F35F-4ECB-805F-F1B15002CCE4}" type="presOf" srcId="{E57571B8-76B3-4DBD-AB12-62351466A144}" destId="{2CB8979D-EB12-4FD7-823E-E18C29F26A6C}" srcOrd="0" destOrd="0" presId="urn:microsoft.com/office/officeart/2008/layout/RadialCluster"/>
-    <dgm:cxn modelId="{3C65D324-0474-4D66-B1CD-2DA867734247}" type="presOf" srcId="{F3387FD0-03C2-49E7-BC48-23BCF1C821D1}" destId="{87EB7461-B202-41C3-B18F-A0F3E6601857}" srcOrd="0" destOrd="0" presId="urn:microsoft.com/office/officeart/2008/layout/RadialCluster"/>
-    <dgm:cxn modelId="{1BE17BED-1E68-4B40-859A-85090FBE9549}" srcId="{F0375D81-EA31-407D-9450-A8FE664209E9}" destId="{A0DD1813-EB36-4B44-90D1-8D815D596B10}" srcOrd="3" destOrd="0" parTransId="{E67B6AC2-E4BC-425A-90E5-90C0896AC2CC}" sibTransId="{4448D2A1-ABB7-4D3E-984F-DC9ED42CD75D}"/>
-    <dgm:cxn modelId="{123B033F-E9A5-4B8F-8778-AEA0E5662BE5}" type="presOf" srcId="{D9B202E9-AE8C-40D2-A015-6D1E4380B06B}" destId="{7B2776D1-F237-415E-A8BD-98ECE5B561A2}" srcOrd="0" destOrd="0" presId="urn:microsoft.com/office/officeart/2008/layout/RadialCluster"/>
-    <dgm:cxn modelId="{A707AF79-CE53-4D5F-AE33-9A5AE80C7715}" srcId="{BBCF9853-183B-4BF0-86E7-F45030B3E232}" destId="{35747D65-C0E3-45F4-B29B-77F49AB95CCE}" srcOrd="1" destOrd="0" parTransId="{3E9E04D1-1302-4E1A-AE3A-AABDBDF394A8}" sibTransId="{19E76A38-155F-479C-8067-7B393F0FA758}"/>
-    <dgm:cxn modelId="{FCACEE32-0BED-4068-8D80-DE87A7CE447C}" type="presOf" srcId="{F859983B-39FB-47E7-8C57-9DD8F40D1D9A}" destId="{A87BA1DD-20A4-4DE3-A085-B1D0326AB74E}" srcOrd="0" destOrd="0" presId="urn:microsoft.com/office/officeart/2008/layout/RadialCluster"/>
-    <dgm:cxn modelId="{44E8498D-CDEC-4CE8-A64C-DCBB2A8ED9A8}" type="presOf" srcId="{1735A180-4B3C-4FB2-95EB-B5F12D12B418}" destId="{BD0E00A4-B95A-437C-BF76-EB23C61FE4BE}" srcOrd="0" destOrd="0" presId="urn:microsoft.com/office/officeart/2008/layout/RadialCluster"/>
     <dgm:cxn modelId="{525B8F5E-46DA-4031-B65A-A1EF231C5AD8}" srcId="{A0DD1813-EB36-4B44-90D1-8D815D596B10}" destId="{BA0CE55D-B380-4A3F-92DC-95FBD2463EE0}" srcOrd="3" destOrd="0" parTransId="{D9B202E9-AE8C-40D2-A015-6D1E4380B06B}" sibTransId="{8F29A3BF-A66B-48F2-B746-1E30CC1AC380}"/>
-    <dgm:cxn modelId="{7974CFA4-BCEA-4C33-8DDA-8CC8769B16FB}" type="presOf" srcId="{76CD3A94-BB58-4E79-AE04-950749E90406}" destId="{60645163-21D0-4CD5-9FB8-587A220A1664}" srcOrd="0" destOrd="0" presId="urn:microsoft.com/office/officeart/2008/layout/RadialCluster"/>
-    <dgm:cxn modelId="{19A40656-4809-4667-AB31-70F262832267}" srcId="{F859983B-39FB-47E7-8C57-9DD8F40D1D9A}" destId="{F0375D81-EA31-407D-9450-A8FE664209E9}" srcOrd="0" destOrd="0" parTransId="{1B8994B9-1FA2-4BCC-B59E-DD923832FA9D}" sibTransId="{F8D3018F-5870-4E34-88B8-AEF8BD26787A}"/>
-    <dgm:cxn modelId="{3685C7FA-D926-4024-A5A0-80EA69274F5B}" type="presOf" srcId="{256FEE81-9056-4F41-86E9-A87A2826DE9D}" destId="{E2CE3FDF-1297-4411-9D78-44A8932D4D01}" srcOrd="0" destOrd="0" presId="urn:microsoft.com/office/officeart/2008/layout/RadialCluster"/>
-    <dgm:cxn modelId="{1634DAE7-9E4C-49C7-8DBA-276DF62C49B4}" type="presOf" srcId="{806EBB18-A966-4973-8080-268AF4E6D478}" destId="{45DBFF19-4A76-4533-998B-AE2989807EE3}" srcOrd="0" destOrd="0" presId="urn:microsoft.com/office/officeart/2008/layout/RadialCluster"/>
-    <dgm:cxn modelId="{ACC8D427-E1A7-4D16-8591-7273ECD7DBFB}" type="presOf" srcId="{E7D2329F-9681-4125-A514-37240D313997}" destId="{13C6C64B-B032-4BA4-83DB-6A35EE2DAC82}" srcOrd="0" destOrd="0" presId="urn:microsoft.com/office/officeart/2008/layout/RadialCluster"/>
     <dgm:cxn modelId="{0A78E7F3-1F2D-4CA9-B7D8-0DEE3CD1AACA}" type="presOf" srcId="{BA0CE55D-B380-4A3F-92DC-95FBD2463EE0}" destId="{F7BC56CE-CBA1-4658-99B9-7FF4E78AF3A8}" srcOrd="0" destOrd="0" presId="urn:microsoft.com/office/officeart/2008/layout/RadialCluster"/>
     <dgm:cxn modelId="{03831E35-B48F-4325-A26E-32E38D819493}" type="presOf" srcId="{3E9E04D1-1302-4E1A-AE3A-AABDBDF394A8}" destId="{7C261A88-DCC1-402A-8F6D-218D973FCEBC}" srcOrd="0" destOrd="0" presId="urn:microsoft.com/office/officeart/2008/layout/RadialCluster"/>
+    <dgm:cxn modelId="{88C0B63A-1A7B-4639-A910-F3D271A6B105}" type="presOf" srcId="{1C2F9CC8-896B-41B3-AF0F-84093C1E8121}" destId="{FDFA6494-C20A-4DF1-9EB1-15EC7E3D468F}" srcOrd="0" destOrd="0" presId="urn:microsoft.com/office/officeart/2008/layout/RadialCluster"/>
+    <dgm:cxn modelId="{159B14ED-7B30-4C98-A8B5-91FDA393F52C}" type="presOf" srcId="{E67B6AC2-E4BC-425A-90E5-90C0896AC2CC}" destId="{D1A3650F-8811-4F02-9044-88FB21A4BFCD}" srcOrd="0" destOrd="0" presId="urn:microsoft.com/office/officeart/2008/layout/RadialCluster"/>
+    <dgm:cxn modelId="{9F1C99D9-6977-4CBF-933F-2F3617748478}" type="presOf" srcId="{9479EB3C-A16E-462A-828B-D51E498566EE}" destId="{14F8E73C-F36A-45CB-BFCE-4B2564C5D8DB}" srcOrd="0" destOrd="0" presId="urn:microsoft.com/office/officeart/2008/layout/RadialCluster"/>
+    <dgm:cxn modelId="{1634DAE7-9E4C-49C7-8DBA-276DF62C49B4}" type="presOf" srcId="{806EBB18-A966-4973-8080-268AF4E6D478}" destId="{45DBFF19-4A76-4533-998B-AE2989807EE3}" srcOrd="0" destOrd="0" presId="urn:microsoft.com/office/officeart/2008/layout/RadialCluster"/>
     <dgm:cxn modelId="{28D4AAB1-5EF4-4632-B865-B65528AC58B9}" type="presOf" srcId="{328C0A48-268C-4B41-ABB7-6DDF12D715AC}" destId="{3CB765B0-9F03-4E47-81C1-10013D386D00}" srcOrd="0" destOrd="0" presId="urn:microsoft.com/office/officeart/2008/layout/RadialCluster"/>
-    <dgm:cxn modelId="{6E0BF7DF-3B64-49DB-89DA-4F8E0A433A24}" type="presOf" srcId="{A0DD1813-EB36-4B44-90D1-8D815D596B10}" destId="{11A06565-916D-439F-9911-EA567A860001}" srcOrd="0" destOrd="0" presId="urn:microsoft.com/office/officeart/2008/layout/RadialCluster"/>
-    <dgm:cxn modelId="{F2CF1DE7-0B47-420F-9398-2992DC3DFB6B}" srcId="{BBCF9853-183B-4BF0-86E7-F45030B3E232}" destId="{328C0A48-268C-4B41-ABB7-6DDF12D715AC}" srcOrd="0" destOrd="0" parTransId="{762F0E84-B23A-4091-8901-A78F7AE85B75}" sibTransId="{5CE6F0E9-D2D4-4DBF-A420-B59D5889D7C4}"/>
-    <dgm:cxn modelId="{8B9A5703-6E58-4332-9110-0C050385FBB6}" srcId="{A0DD1813-EB36-4B44-90D1-8D815D596B10}" destId="{1735A180-4B3C-4FB2-95EB-B5F12D12B418}" srcOrd="2" destOrd="0" parTransId="{14C2A219-D87C-4A41-8355-454819345B24}" sibTransId="{FAD1D1C0-A72C-4FD6-9D14-4CB9F8F9E9AC}"/>
-    <dgm:cxn modelId="{BBB42A01-97D0-426E-8FB9-47FC2C033C25}" type="presOf" srcId="{35747D65-C0E3-45F4-B29B-77F49AB95CCE}" destId="{785EF704-5E01-4C5D-9B6C-C1A4F4F2BC65}" srcOrd="0" destOrd="0" presId="urn:microsoft.com/office/officeart/2008/layout/RadialCluster"/>
-    <dgm:cxn modelId="{159B14ED-7B30-4C98-A8B5-91FDA393F52C}" type="presOf" srcId="{E67B6AC2-E4BC-425A-90E5-90C0896AC2CC}" destId="{D1A3650F-8811-4F02-9044-88FB21A4BFCD}" srcOrd="0" destOrd="0" presId="urn:microsoft.com/office/officeart/2008/layout/RadialCluster"/>
+    <dgm:cxn modelId="{2D5D53CD-9B7B-4AE0-87BD-7156F79CDC5B}" type="presOf" srcId="{9C91AE0B-CDBD-4C19-8B02-531F0A655388}" destId="{36B922F0-8DD1-4CE5-9219-E2A03E341421}" srcOrd="0" destOrd="0" presId="urn:microsoft.com/office/officeart/2008/layout/RadialCluster"/>
+    <dgm:cxn modelId="{D7197B27-5FA6-4310-93F9-C9344A9094D0}" srcId="{B4383D45-2EB5-431F-9E3B-61E0E61EA173}" destId="{256FEE81-9056-4F41-86E9-A87A2826DE9D}" srcOrd="2" destOrd="0" parTransId="{E57571B8-76B3-4DBD-AB12-62351466A144}" sibTransId="{41CA1FCF-EA3E-4AB0-8629-2F7162A98042}"/>
+    <dgm:cxn modelId="{7974CFA4-BCEA-4C33-8DDA-8CC8769B16FB}" type="presOf" srcId="{76CD3A94-BB58-4E79-AE04-950749E90406}" destId="{60645163-21D0-4CD5-9FB8-587A220A1664}" srcOrd="0" destOrd="0" presId="urn:microsoft.com/office/officeart/2008/layout/RadialCluster"/>
     <dgm:cxn modelId="{26F35AD4-0A62-452B-B715-398133FB7A73}" type="presOf" srcId="{B4383D45-2EB5-431F-9E3B-61E0E61EA173}" destId="{162F5FFA-826E-4752-85DB-80F67E99A00F}" srcOrd="0" destOrd="0" presId="urn:microsoft.com/office/officeart/2008/layout/RadialCluster"/>
-    <dgm:cxn modelId="{4FBAF1D3-BBC6-4C17-B0B3-61B392007395}" srcId="{F0375D81-EA31-407D-9450-A8FE664209E9}" destId="{B4383D45-2EB5-431F-9E3B-61E0E61EA173}" srcOrd="1" destOrd="0" parTransId="{806EBB18-A966-4973-8080-268AF4E6D478}" sibTransId="{3868CC5F-FB5D-4E2B-9183-84D4EF55EAB2}"/>
+    <dgm:cxn modelId="{9D196EFC-914A-4B9C-8335-EA474951B02D}" type="presOf" srcId="{F0375D81-EA31-407D-9450-A8FE664209E9}" destId="{2C61CDB8-1126-4D10-8A0C-A887CB36E88D}" srcOrd="0" destOrd="0" presId="urn:microsoft.com/office/officeart/2008/layout/RadialCluster"/>
     <dgm:cxn modelId="{47577129-0AEF-42E7-B58E-D3BCAA107C9A}" type="presOf" srcId="{511F46B2-9729-40F5-A774-4D9C08F18E83}" destId="{D798D8B1-4DD5-4F76-A915-4D9BC4A9F7BC}" srcOrd="0" destOrd="0" presId="urn:microsoft.com/office/officeart/2008/layout/RadialCluster"/>
-    <dgm:cxn modelId="{282DDE30-BF8C-474A-9509-1C7DF5018B8C}" type="presOf" srcId="{0249E7AD-330C-42C9-9CF1-85C044344138}" destId="{5CE3542D-079C-435F-B81F-B7EB2B4F5618}" srcOrd="0" destOrd="0" presId="urn:microsoft.com/office/officeart/2008/layout/RadialCluster"/>
-    <dgm:cxn modelId="{D3A9AB68-7564-493B-8836-765DDD3E7691}" type="presOf" srcId="{762F0E84-B23A-4091-8901-A78F7AE85B75}" destId="{C78F9FD8-1B2A-4A2C-98A7-59E90813D8F9}" srcOrd="0" destOrd="0" presId="urn:microsoft.com/office/officeart/2008/layout/RadialCluster"/>
-    <dgm:cxn modelId="{D7197B27-5FA6-4310-93F9-C9344A9094D0}" srcId="{B4383D45-2EB5-431F-9E3B-61E0E61EA173}" destId="{256FEE81-9056-4F41-86E9-A87A2826DE9D}" srcOrd="2" destOrd="0" parTransId="{E57571B8-76B3-4DBD-AB12-62351466A144}" sibTransId="{41CA1FCF-EA3E-4AB0-8629-2F7162A98042}"/>
-    <dgm:cxn modelId="{6C82ACCC-4F75-4318-9654-105491425942}" srcId="{F0375D81-EA31-407D-9450-A8FE664209E9}" destId="{A899F7D4-A4FB-438D-8EE9-50E475B215B7}" srcOrd="0" destOrd="0" parTransId="{511F46B2-9729-40F5-A774-4D9C08F18E83}" sibTransId="{FB54FE33-EE5B-404B-9C7C-A4B629952FAC}"/>
-    <dgm:cxn modelId="{1AC44F4B-F912-4002-81FF-5C4B7E96BE01}" type="presOf" srcId="{032E0D3E-E48E-4E6A-BD8A-5430FC59272E}" destId="{F1052044-0FDD-422D-B472-4653C35157C6}" srcOrd="0" destOrd="0" presId="urn:microsoft.com/office/officeart/2008/layout/RadialCluster"/>
+    <dgm:cxn modelId="{9D7A167B-95AA-4E1E-B3D9-F736BBA066E2}" srcId="{B4383D45-2EB5-431F-9E3B-61E0E61EA173}" destId="{F3387FD0-03C2-49E7-BC48-23BCF1C821D1}" srcOrd="1" destOrd="0" parTransId="{032E0D3E-E48E-4E6A-BD8A-5430FC59272E}" sibTransId="{5CFBA39C-DAD5-47F7-A30E-1AB44EB4E519}"/>
+    <dgm:cxn modelId="{ACC8D427-E1A7-4D16-8591-7273ECD7DBFB}" type="presOf" srcId="{E7D2329F-9681-4125-A514-37240D313997}" destId="{13C6C64B-B032-4BA4-83DB-6A35EE2DAC82}" srcOrd="0" destOrd="0" presId="urn:microsoft.com/office/officeart/2008/layout/RadialCluster"/>
+    <dgm:cxn modelId="{BDF3C253-909D-447A-AFF0-FB66AF70313E}" srcId="{A0DD1813-EB36-4B44-90D1-8D815D596B10}" destId="{DD5A8A72-D66B-4F22-BC00-3BEC12B711C3}" srcOrd="1" destOrd="0" parTransId="{0249E7AD-330C-42C9-9CF1-85C044344138}" sibTransId="{2ADC5E6A-35B0-4E8C-8EE9-7F0314B6476D}"/>
+    <dgm:cxn modelId="{FCACEE32-0BED-4068-8D80-DE87A7CE447C}" type="presOf" srcId="{F859983B-39FB-47E7-8C57-9DD8F40D1D9A}" destId="{A87BA1DD-20A4-4DE3-A085-B1D0326AB74E}" srcOrd="0" destOrd="0" presId="urn:microsoft.com/office/officeart/2008/layout/RadialCluster"/>
+    <dgm:cxn modelId="{A707AF79-CE53-4D5F-AE33-9A5AE80C7715}" srcId="{BBCF9853-183B-4BF0-86E7-F45030B3E232}" destId="{35747D65-C0E3-45F4-B29B-77F49AB95CCE}" srcOrd="1" destOrd="0" parTransId="{3E9E04D1-1302-4E1A-AE3A-AABDBDF394A8}" sibTransId="{19E76A38-155F-479C-8067-7B393F0FA758}"/>
     <dgm:cxn modelId="{CE2C0CEA-871F-407F-83C7-8DDC9EC3B74B}" srcId="{F0375D81-EA31-407D-9450-A8FE664209E9}" destId="{BBCF9853-183B-4BF0-86E7-F45030B3E232}" srcOrd="2" destOrd="0" parTransId="{0E9B778E-2EA7-4990-AB0C-12820DF4FB7A}" sibTransId="{AB733780-A582-43D3-99EF-035D4FB6A336}"/>
-    <dgm:cxn modelId="{923EE879-5E5C-4AC5-AF48-B703EE09B99B}" srcId="{A899F7D4-A4FB-438D-8EE9-50E475B215B7}" destId="{71417C9C-41D5-467E-9678-7E5EF1DEAA64}" srcOrd="0" destOrd="0" parTransId="{9479EB3C-A16E-462A-828B-D51E498566EE}" sibTransId="{CC466F42-389B-45F4-9AE2-3F446F36D922}"/>
-    <dgm:cxn modelId="{2D5D53CD-9B7B-4AE0-87BD-7156F79CDC5B}" type="presOf" srcId="{9C91AE0B-CDBD-4C19-8B02-531F0A655388}" destId="{36B922F0-8DD1-4CE5-9219-E2A03E341421}" srcOrd="0" destOrd="0" presId="urn:microsoft.com/office/officeart/2008/layout/RadialCluster"/>
+    <dgm:cxn modelId="{3685C7FA-D926-4024-A5A0-80EA69274F5B}" type="presOf" srcId="{256FEE81-9056-4F41-86E9-A87A2826DE9D}" destId="{E2CE3FDF-1297-4411-9D78-44A8932D4D01}" srcOrd="0" destOrd="0" presId="urn:microsoft.com/office/officeart/2008/layout/RadialCluster"/>
     <dgm:cxn modelId="{D181D664-068E-4C97-A6A3-5D2E9E877A06}" type="presParOf" srcId="{A87BA1DD-20A4-4DE3-A085-B1D0326AB74E}" destId="{2C61CDB8-1126-4D10-8A0C-A887CB36E88D}" srcOrd="0" destOrd="0" presId="urn:microsoft.com/office/officeart/2008/layout/RadialCluster"/>
     <dgm:cxn modelId="{6ADA04E5-AB01-46DC-B45D-DCBA80C68392}" type="presParOf" srcId="{A87BA1DD-20A4-4DE3-A085-B1D0326AB74E}" destId="{99162502-7E36-4BA7-BFCB-D56C5DFB7F09}" srcOrd="1" destOrd="0" presId="urn:microsoft.com/office/officeart/2008/layout/RadialCluster"/>
     <dgm:cxn modelId="{C19AA12E-1535-418A-9CFE-18FCF22DE2F0}" type="presParOf" srcId="{99162502-7E36-4BA7-BFCB-D56C5DFB7F09}" destId="{26DAB9AD-417E-4638-A432-60D1AD968EEE}" srcOrd="0" destOrd="0" presId="urn:microsoft.com/office/officeart/2008/layout/RadialCluster"/>
@@ -8467,7 +8670,7 @@
               </a:spcAft>
             </a:pPr>
             <a:r>
-              <a:rPr lang="en-US" sz="4000" b="1" u="none" strike="noStrike" cap="none" spc="0">
+              <a:rPr lang="en-US" sz="4000" b="1" u="none" strike="noStrike" cap="none" spc="0" dirty="0" err="1">
                 <a:solidFill>
                   <a:srgbClr val="FFFFFF">
                     <a:alpha val="100000"/>
@@ -8475,8 +8678,82 @@
                 </a:solidFill>
                 <a:latin typeface="Calibri"/>
               </a:rPr>
-              <a:t>Интерпретатор C-подобного языка программирования</a:t>
-            </a:r>
+              <a:t>Интерпретатор</a:t>
+            </a:r>
+            <a:r>
+              <a:rPr lang="en-US" sz="4000" b="1" u="none" strike="noStrike" cap="none" spc="0" dirty="0">
+                <a:solidFill>
+                  <a:srgbClr val="FFFFFF">
+                    <a:alpha val="100000"/>
+                  </a:srgbClr>
+                </a:solidFill>
+                <a:latin typeface="Calibri"/>
+              </a:rPr>
+              <a:t> C-</a:t>
+            </a:r>
+            <a:r>
+              <a:rPr lang="en-US" sz="4000" b="1" u="none" strike="noStrike" cap="none" spc="0" dirty="0" err="1">
+                <a:solidFill>
+                  <a:srgbClr val="FFFFFF">
+                    <a:alpha val="100000"/>
+                  </a:srgbClr>
+                </a:solidFill>
+                <a:latin typeface="Calibri"/>
+              </a:rPr>
+              <a:t>подобного</a:t>
+            </a:r>
+            <a:r>
+              <a:rPr lang="en-US" sz="4000" b="1" u="none" strike="noStrike" cap="none" spc="0" dirty="0">
+                <a:solidFill>
+                  <a:srgbClr val="FFFFFF">
+                    <a:alpha val="100000"/>
+                  </a:srgbClr>
+                </a:solidFill>
+                <a:latin typeface="Calibri"/>
+              </a:rPr>
+              <a:t> </a:t>
+            </a:r>
+            <a:r>
+              <a:rPr lang="en-US" sz="4000" b="1" u="none" strike="noStrike" cap="none" spc="0" dirty="0" err="1">
+                <a:solidFill>
+                  <a:srgbClr val="FFFFFF">
+                    <a:alpha val="100000"/>
+                  </a:srgbClr>
+                </a:solidFill>
+                <a:latin typeface="Calibri"/>
+              </a:rPr>
+              <a:t>языка</a:t>
+            </a:r>
+            <a:r>
+              <a:rPr lang="en-US" sz="4000" b="1" u="none" strike="noStrike" cap="none" spc="0" dirty="0">
+                <a:solidFill>
+                  <a:srgbClr val="FFFFFF">
+                    <a:alpha val="100000"/>
+                  </a:srgbClr>
+                </a:solidFill>
+                <a:latin typeface="Calibri"/>
+              </a:rPr>
+              <a:t> </a:t>
+            </a:r>
+            <a:r>
+              <a:rPr lang="en-US" sz="4000" b="1" u="none" strike="noStrike" cap="none" spc="0" dirty="0" err="1">
+                <a:solidFill>
+                  <a:srgbClr val="FFFFFF">
+                    <a:alpha val="100000"/>
+                  </a:srgbClr>
+                </a:solidFill>
+                <a:latin typeface="Calibri"/>
+              </a:rPr>
+              <a:t>программирования</a:t>
+            </a:r>
+            <a:endParaRPr lang="en-US" sz="4000" b="1" u="none" strike="noStrike" cap="none" spc="0" dirty="0">
+              <a:solidFill>
+                <a:srgbClr val="FFFFFF">
+                  <a:alpha val="100000"/>
+                </a:srgbClr>
+              </a:solidFill>
+              <a:latin typeface="Calibri"/>
+            </a:endParaRPr>
           </a:p>
         </p:txBody>
       </p:sp>
@@ -8618,115 +8895,896 @@
           </a:p>
         </p:txBody>
       </p:sp>
-      <p:sp>
-        <p:nvSpPr>
-          <p:cNvPr id="3" name="TextBox 2"/>
-          <p:cNvSpPr txBox="1"/>
-          <p:nvPr/>
-        </p:nvSpPr>
-        <p:spPr>
-          <a:xfrm>
-            <a:off x="914400" y="1800225"/>
-            <a:ext cx="7315200" cy="1015663"/>
-          </a:xfrm>
-          <a:prstGeom prst="rect">
-            <a:avLst/>
-          </a:prstGeom>
-          <a:noFill/>
-        </p:spPr>
-        <p:txBody>
-          <a:bodyPr vert="horz" lIns="91440" tIns="45720" rIns="91440" bIns="45720" rtlCol="0" anchorCtr="0">
-            <a:spAutoFit/>
-          </a:bodyPr>
-          <a:lstStyle/>
-          <a:p>
-            <a:pPr marL="342900" marR="0" lvl="0" indent="-342900" algn="l" rtl="0" fontAlgn="base">
-              <a:lnSpc>
-                <a:spcPct val="100000"/>
-              </a:lnSpc>
-              <a:spcBef>
-                <a:spcPts val="0"/>
-              </a:spcBef>
-              <a:spcAft>
-                <a:spcPts val="0"/>
-              </a:spcAft>
-              <a:buFont typeface="Arial" panose="020B0604020202020204" pitchFamily="34" charset="0"/>
-              <a:buChar char="•"/>
-            </a:pPr>
-            <a:r>
-              <a:rPr lang="ru-RU" sz="2000" dirty="0" smtClean="0">
-                <a:solidFill>
-                  <a:srgbClr val="FFFFFF">
-                    <a:alpha val="100000"/>
-                  </a:srgbClr>
-                </a:solidFill>
-                <a:latin typeface="Calibri"/>
-              </a:rPr>
-              <a:t>Первая работа</a:t>
-            </a:r>
-          </a:p>
-          <a:p>
-            <a:pPr marL="342900" marR="0" lvl="0" indent="-342900" algn="l" rtl="0" fontAlgn="base">
-              <a:lnSpc>
-                <a:spcPct val="100000"/>
-              </a:lnSpc>
-              <a:spcBef>
-                <a:spcPts val="0"/>
-              </a:spcBef>
-              <a:spcAft>
-                <a:spcPts val="0"/>
-              </a:spcAft>
-              <a:buFont typeface="Arial" panose="020B0604020202020204" pitchFamily="34" charset="0"/>
-              <a:buChar char="•"/>
-            </a:pPr>
-            <a:r>
-              <a:rPr lang="ru-RU" sz="2000" u="none" strike="noStrike" cap="none" spc="0" dirty="0" smtClean="0">
-                <a:solidFill>
-                  <a:srgbClr val="FFFFFF">
-                    <a:alpha val="100000"/>
-                  </a:srgbClr>
-                </a:solidFill>
-                <a:latin typeface="Calibri"/>
-              </a:rPr>
-              <a:t>Вторая работа</a:t>
-            </a:r>
-          </a:p>
-          <a:p>
-            <a:pPr marL="342900" marR="0" lvl="0" indent="-342900" algn="l" rtl="0" fontAlgn="base">
-              <a:lnSpc>
-                <a:spcPct val="100000"/>
-              </a:lnSpc>
-              <a:spcBef>
-                <a:spcPts val="0"/>
-              </a:spcBef>
-              <a:spcAft>
-                <a:spcPts val="0"/>
-              </a:spcAft>
-              <a:buFont typeface="Arial" panose="020B0604020202020204" pitchFamily="34" charset="0"/>
-              <a:buChar char="•"/>
-            </a:pPr>
-            <a:r>
-              <a:rPr lang="ru-RU" sz="2000" dirty="0" smtClean="0">
-                <a:solidFill>
-                  <a:srgbClr val="FFFFFF">
-                    <a:alpha val="100000"/>
-                  </a:srgbClr>
-                </a:solidFill>
-                <a:latin typeface="Calibri"/>
-              </a:rPr>
-              <a:t>Третья работа</a:t>
-            </a:r>
-            <a:endParaRPr lang="en-US" sz="2000" u="none" strike="noStrike" cap="none" spc="0" dirty="0">
-              <a:solidFill>
-                <a:srgbClr val="FFFFFF">
-                  <a:alpha val="100000"/>
-                </a:srgbClr>
-              </a:solidFill>
-              <a:latin typeface="Calibri"/>
-            </a:endParaRPr>
-          </a:p>
-        </p:txBody>
-      </p:sp>
+      <mc:AlternateContent xmlns:mc="http://schemas.openxmlformats.org/markup-compatibility/2006">
+        <mc:Choice xmlns:a14="http://schemas.microsoft.com/office/drawing/2010/main" Requires="a14">
+          <p:sp>
+            <p:nvSpPr>
+              <p:cNvPr id="3" name="TextBox 2"/>
+              <p:cNvSpPr txBox="1"/>
+              <p:nvPr/>
+            </p:nvSpPr>
+            <p:spPr>
+              <a:xfrm>
+                <a:off x="914400" y="1800225"/>
+                <a:ext cx="7315200" cy="2862322"/>
+              </a:xfrm>
+              <a:prstGeom prst="rect">
+                <a:avLst/>
+              </a:prstGeom>
+              <a:noFill/>
+            </p:spPr>
+            <p:txBody>
+              <a:bodyPr vert="horz" lIns="91440" tIns="45720" rIns="91440" bIns="45720" rtlCol="0" anchorCtr="0">
+                <a:spAutoFit/>
+              </a:bodyPr>
+              <a:lstStyle/>
+              <a:p>
+                <a:pPr marL="342900" lvl="0" indent="-342900" fontAlgn="base">
+                  <a:buFont typeface="Arial" panose="020B0604020202020204" pitchFamily="34" charset="0"/>
+                  <a:buChar char="•"/>
+                </a:pPr>
+                <a:r>
+                  <a:rPr lang="ru-RU" sz="2000" dirty="0" smtClean="0">
+                    <a:solidFill>
+                      <a:schemeClr val="bg1"/>
+                    </a:solidFill>
+                    <a:latin typeface="Calibri"/>
+                  </a:rPr>
+                  <a:t>При объявлении массива </a:t>
+                </a:r>
+                <a14:m>
+                  <m:oMath xmlns:m="http://schemas.openxmlformats.org/officeDocument/2006/math">
+                    <m:r>
+                      <a:rPr lang="ru-RU" sz="2000" i="1">
+                        <a:solidFill>
+                          <a:schemeClr val="bg1"/>
+                        </a:solidFill>
+                        <a:latin typeface="Cambria Math" panose="02040503050406030204" pitchFamily="18" charset="0"/>
+                      </a:rPr>
+                      <m:t>𝑚𝑎𝑠</m:t>
+                    </m:r>
+                    <m:r>
+                      <a:rPr lang="ru-RU" sz="2000" i="1">
+                        <a:solidFill>
+                          <a:schemeClr val="bg1"/>
+                        </a:solidFill>
+                        <a:latin typeface="Cambria Math" panose="02040503050406030204" pitchFamily="18" charset="0"/>
+                      </a:rPr>
+                      <m:t>[</m:t>
+                    </m:r>
+                    <m:sSub>
+                      <m:sSubPr>
+                        <m:ctrlPr>
+                          <a:rPr lang="ru-RU" sz="2000" i="1">
+                            <a:solidFill>
+                              <a:schemeClr val="bg1"/>
+                            </a:solidFill>
+                            <a:latin typeface="Cambria Math" panose="02040503050406030204" pitchFamily="18" charset="0"/>
+                          </a:rPr>
+                        </m:ctrlPr>
+                      </m:sSubPr>
+                      <m:e>
+                        <m:r>
+                          <a:rPr lang="en-US" sz="2000" b="0" i="1" smtClean="0">
+                            <a:solidFill>
+                              <a:schemeClr val="bg1"/>
+                            </a:solidFill>
+                            <a:latin typeface="Cambria Math" panose="02040503050406030204" pitchFamily="18" charset="0"/>
+                          </a:rPr>
+                          <m:t>𝑘</m:t>
+                        </m:r>
+                      </m:e>
+                      <m:sub>
+                        <m:r>
+                          <a:rPr lang="ru-RU" sz="2000" i="1">
+                            <a:solidFill>
+                              <a:schemeClr val="bg1"/>
+                            </a:solidFill>
+                            <a:latin typeface="Cambria Math" panose="02040503050406030204" pitchFamily="18" charset="0"/>
+                          </a:rPr>
+                          <m:t>1</m:t>
+                        </m:r>
+                      </m:sub>
+                    </m:sSub>
+                    <m:r>
+                      <a:rPr lang="ru-RU" sz="2000" i="1">
+                        <a:solidFill>
+                          <a:schemeClr val="bg1"/>
+                        </a:solidFill>
+                        <a:latin typeface="Cambria Math" panose="02040503050406030204" pitchFamily="18" charset="0"/>
+                      </a:rPr>
+                      <m:t>][</m:t>
+                    </m:r>
+                    <m:sSub>
+                      <m:sSubPr>
+                        <m:ctrlPr>
+                          <a:rPr lang="ru-RU" sz="2000" i="1">
+                            <a:solidFill>
+                              <a:schemeClr val="bg1"/>
+                            </a:solidFill>
+                            <a:latin typeface="Cambria Math" panose="02040503050406030204" pitchFamily="18" charset="0"/>
+                          </a:rPr>
+                        </m:ctrlPr>
+                      </m:sSubPr>
+                      <m:e>
+                        <m:r>
+                          <a:rPr lang="en-US" sz="2000" b="0" i="1" smtClean="0">
+                            <a:solidFill>
+                              <a:schemeClr val="bg1"/>
+                            </a:solidFill>
+                            <a:latin typeface="Cambria Math" panose="02040503050406030204" pitchFamily="18" charset="0"/>
+                          </a:rPr>
+                          <m:t>𝑘</m:t>
+                        </m:r>
+                      </m:e>
+                      <m:sub>
+                        <m:r>
+                          <a:rPr lang="ru-RU" sz="2000" i="1">
+                            <a:solidFill>
+                              <a:schemeClr val="bg1"/>
+                            </a:solidFill>
+                            <a:latin typeface="Cambria Math" panose="02040503050406030204" pitchFamily="18" charset="0"/>
+                          </a:rPr>
+                          <m:t>2</m:t>
+                        </m:r>
+                      </m:sub>
+                    </m:sSub>
+                    <m:r>
+                      <a:rPr lang="ru-RU" sz="2000" i="1">
+                        <a:solidFill>
+                          <a:schemeClr val="bg1"/>
+                        </a:solidFill>
+                        <a:latin typeface="Cambria Math" panose="02040503050406030204" pitchFamily="18" charset="0"/>
+                      </a:rPr>
+                      <m:t>]...[</m:t>
+                    </m:r>
+                    <m:sSub>
+                      <m:sSubPr>
+                        <m:ctrlPr>
+                          <a:rPr lang="ru-RU" sz="2000" i="1">
+                            <a:solidFill>
+                              <a:schemeClr val="bg1"/>
+                            </a:solidFill>
+                            <a:latin typeface="Cambria Math" panose="02040503050406030204" pitchFamily="18" charset="0"/>
+                          </a:rPr>
+                        </m:ctrlPr>
+                      </m:sSubPr>
+                      <m:e>
+                        <m:r>
+                          <a:rPr lang="en-US" sz="2000" b="0" i="1" smtClean="0">
+                            <a:solidFill>
+                              <a:schemeClr val="bg1"/>
+                            </a:solidFill>
+                            <a:latin typeface="Cambria Math" panose="02040503050406030204" pitchFamily="18" charset="0"/>
+                          </a:rPr>
+                          <m:t>𝑘</m:t>
+                        </m:r>
+                      </m:e>
+                      <m:sub>
+                        <m:r>
+                          <a:rPr lang="ru-RU" sz="2000" i="1">
+                            <a:solidFill>
+                              <a:schemeClr val="bg1"/>
+                            </a:solidFill>
+                            <a:latin typeface="Cambria Math" panose="02040503050406030204" pitchFamily="18" charset="0"/>
+                          </a:rPr>
+                          <m:t>𝑛</m:t>
+                        </m:r>
+                      </m:sub>
+                    </m:sSub>
+                    <m:r>
+                      <a:rPr lang="ru-RU" sz="2000" i="1">
+                        <a:solidFill>
+                          <a:schemeClr val="bg1"/>
+                        </a:solidFill>
+                        <a:latin typeface="Cambria Math" panose="02040503050406030204" pitchFamily="18" charset="0"/>
+                      </a:rPr>
+                      <m:t>]</m:t>
+                    </m:r>
+                  </m:oMath>
+                </a14:m>
+                <a:r>
+                  <a:rPr lang="ru-RU" sz="2000" dirty="0">
+                    <a:solidFill>
+                      <a:schemeClr val="bg1"/>
+                    </a:solidFill>
+                  </a:rPr>
+                  <a:t> </a:t>
+                </a:r>
+                <a:r>
+                  <a:rPr lang="ru-RU" sz="2000" dirty="0" smtClean="0">
+                    <a:solidFill>
+                      <a:schemeClr val="bg1"/>
+                    </a:solidFill>
+                  </a:rPr>
+                  <a:t>выделяется </a:t>
+                </a:r>
+                <a14:m>
+                  <m:oMath xmlns:m="http://schemas.openxmlformats.org/officeDocument/2006/math">
+                    <m:sSub>
+                      <m:sSubPr>
+                        <m:ctrlPr>
+                          <a:rPr lang="ru-RU" sz="2000" i="1" smtClean="0">
+                            <a:solidFill>
+                              <a:schemeClr val="bg1"/>
+                            </a:solidFill>
+                          </a:rPr>
+                        </m:ctrlPr>
+                      </m:sSubPr>
+                      <m:e>
+                        <m:r>
+                          <a:rPr lang="ru-RU" sz="2000" i="1">
+                            <a:solidFill>
+                              <a:schemeClr val="bg1"/>
+                            </a:solidFill>
+                          </a:rPr>
+                          <m:t>𝑘</m:t>
+                        </m:r>
+                      </m:e>
+                      <m:sub>
+                        <m:r>
+                          <a:rPr lang="ru-RU" sz="2000" i="1">
+                            <a:solidFill>
+                              <a:schemeClr val="bg1"/>
+                            </a:solidFill>
+                          </a:rPr>
+                          <m:t>1</m:t>
+                        </m:r>
+                      </m:sub>
+                    </m:sSub>
+                    <m:r>
+                      <a:rPr lang="ru-RU" sz="2000" i="1">
+                        <a:solidFill>
+                          <a:schemeClr val="bg1"/>
+                        </a:solidFill>
+                      </a:rPr>
+                      <m:t>∗</m:t>
+                    </m:r>
+                    <m:sSub>
+                      <m:sSubPr>
+                        <m:ctrlPr>
+                          <a:rPr lang="ru-RU" sz="2000" i="1">
+                            <a:solidFill>
+                              <a:schemeClr val="bg1"/>
+                            </a:solidFill>
+                          </a:rPr>
+                        </m:ctrlPr>
+                      </m:sSubPr>
+                      <m:e>
+                        <m:r>
+                          <a:rPr lang="ru-RU" sz="2000" i="1">
+                            <a:solidFill>
+                              <a:schemeClr val="bg1"/>
+                            </a:solidFill>
+                          </a:rPr>
+                          <m:t>𝑘</m:t>
+                        </m:r>
+                      </m:e>
+                      <m:sub>
+                        <m:r>
+                          <a:rPr lang="ru-RU" sz="2000" i="1">
+                            <a:solidFill>
+                              <a:schemeClr val="bg1"/>
+                            </a:solidFill>
+                          </a:rPr>
+                          <m:t>2</m:t>
+                        </m:r>
+                      </m:sub>
+                    </m:sSub>
+                    <m:r>
+                      <a:rPr lang="ru-RU" sz="2000" i="1">
+                        <a:solidFill>
+                          <a:schemeClr val="bg1"/>
+                        </a:solidFill>
+                      </a:rPr>
+                      <m:t>∗ ... ∗</m:t>
+                    </m:r>
+                    <m:sSub>
+                      <m:sSubPr>
+                        <m:ctrlPr>
+                          <a:rPr lang="ru-RU" sz="2000" i="1">
+                            <a:solidFill>
+                              <a:schemeClr val="bg1"/>
+                            </a:solidFill>
+                          </a:rPr>
+                        </m:ctrlPr>
+                      </m:sSubPr>
+                      <m:e>
+                        <m:r>
+                          <a:rPr lang="ru-RU" sz="2000" i="1">
+                            <a:solidFill>
+                              <a:schemeClr val="bg1"/>
+                            </a:solidFill>
+                          </a:rPr>
+                          <m:t>𝑘</m:t>
+                        </m:r>
+                      </m:e>
+                      <m:sub>
+                        <m:r>
+                          <a:rPr lang="ru-RU" sz="2000" i="1">
+                            <a:solidFill>
+                              <a:schemeClr val="bg1"/>
+                            </a:solidFill>
+                          </a:rPr>
+                          <m:t>𝑛</m:t>
+                        </m:r>
+                      </m:sub>
+                    </m:sSub>
+                    <m:r>
+                      <a:rPr lang="ru-RU" sz="2000" b="0" i="1" smtClean="0">
+                        <a:solidFill>
+                          <a:schemeClr val="bg1"/>
+                        </a:solidFill>
+                        <a:latin typeface="Cambria Math" panose="02040503050406030204" pitchFamily="18" charset="0"/>
+                      </a:rPr>
+                      <m:t>∗</m:t>
+                    </m:r>
+                    <m:r>
+                      <a:rPr lang="en-US" sz="2000" b="0" i="1" smtClean="0">
+                        <a:solidFill>
+                          <a:schemeClr val="bg1"/>
+                        </a:solidFill>
+                        <a:latin typeface="Cambria Math" panose="02040503050406030204" pitchFamily="18" charset="0"/>
+                      </a:rPr>
+                      <m:t>𝑠𝑖𝑧𝑒𝑜𝑓</m:t>
+                    </m:r>
+                    <m:r>
+                      <a:rPr lang="en-US" sz="2000" b="0" i="1" smtClean="0">
+                        <a:solidFill>
+                          <a:schemeClr val="bg1"/>
+                        </a:solidFill>
+                        <a:latin typeface="Cambria Math" panose="02040503050406030204" pitchFamily="18" charset="0"/>
+                      </a:rPr>
+                      <m:t>(</m:t>
+                    </m:r>
+                    <m:r>
+                      <a:rPr lang="en-US" sz="2000" b="0" i="1" smtClean="0">
+                        <a:solidFill>
+                          <a:schemeClr val="bg1"/>
+                        </a:solidFill>
+                        <a:latin typeface="Cambria Math" panose="02040503050406030204" pitchFamily="18" charset="0"/>
+                      </a:rPr>
+                      <m:t>𝑡𝑦𝑝𝑒𝑛𝑎𝑚𝑒</m:t>
+                    </m:r>
+                    <m:r>
+                      <a:rPr lang="en-US" sz="2000" b="0" i="1" smtClean="0">
+                        <a:solidFill>
+                          <a:schemeClr val="bg1"/>
+                        </a:solidFill>
+                        <a:latin typeface="Cambria Math" panose="02040503050406030204" pitchFamily="18" charset="0"/>
+                      </a:rPr>
+                      <m:t>)</m:t>
+                    </m:r>
+                  </m:oMath>
+                </a14:m>
+                <a:r>
+                  <a:rPr lang="en-US" sz="2000" dirty="0" smtClean="0">
+                    <a:solidFill>
+                      <a:schemeClr val="bg1"/>
+                    </a:solidFill>
+                  </a:rPr>
+                  <a:t> </a:t>
+                </a:r>
+                <a:r>
+                  <a:rPr lang="ru-RU" sz="2000" dirty="0" smtClean="0">
+                    <a:solidFill>
+                      <a:schemeClr val="bg1"/>
+                    </a:solidFill>
+                  </a:rPr>
+                  <a:t>памяти</a:t>
+                </a:r>
+              </a:p>
+              <a:p>
+                <a:pPr marL="342900" lvl="0" indent="-342900" fontAlgn="base">
+                  <a:buFont typeface="Arial" panose="020B0604020202020204" pitchFamily="34" charset="0"/>
+                  <a:buChar char="•"/>
+                </a:pPr>
+                <a:endParaRPr lang="ru-RU" sz="2000" dirty="0" smtClean="0">
+                  <a:solidFill>
+                    <a:schemeClr val="bg1"/>
+                  </a:solidFill>
+                  <a:latin typeface="Calibri"/>
+                </a:endParaRPr>
+              </a:p>
+              <a:p>
+                <a:pPr marL="342900" lvl="0" indent="-342900" fontAlgn="base">
+                  <a:buFont typeface="Arial" panose="020B0604020202020204" pitchFamily="34" charset="0"/>
+                  <a:buChar char="•"/>
+                </a:pPr>
+                <a:r>
+                  <a:rPr lang="ru-RU" sz="2000" u="none" strike="noStrike" cap="none" spc="0" dirty="0" smtClean="0">
+                    <a:solidFill>
+                      <a:schemeClr val="bg1"/>
+                    </a:solidFill>
+                    <a:latin typeface="Calibri"/>
+                  </a:rPr>
+                  <a:t>При индексации к массиву </a:t>
+                </a:r>
+                <a14:m>
+                  <m:oMath xmlns:m="http://schemas.openxmlformats.org/officeDocument/2006/math">
+                    <m:r>
+                      <a:rPr lang="ru-RU" sz="2000" i="1" smtClean="0">
+                        <a:solidFill>
+                          <a:schemeClr val="bg1"/>
+                        </a:solidFill>
+                      </a:rPr>
+                      <m:t>𝑚𝑎𝑠</m:t>
+                    </m:r>
+                    <m:r>
+                      <a:rPr lang="ru-RU" sz="2000" i="1" smtClean="0">
+                        <a:solidFill>
+                          <a:schemeClr val="bg1"/>
+                        </a:solidFill>
+                      </a:rPr>
+                      <m:t>[</m:t>
+                    </m:r>
+                    <m:sSub>
+                      <m:sSubPr>
+                        <m:ctrlPr>
+                          <a:rPr lang="ru-RU" sz="2000" i="1">
+                            <a:solidFill>
+                              <a:schemeClr val="bg1"/>
+                            </a:solidFill>
+                          </a:rPr>
+                        </m:ctrlPr>
+                      </m:sSubPr>
+                      <m:e>
+                        <m:r>
+                          <a:rPr lang="ru-RU" sz="2000" i="1">
+                            <a:solidFill>
+                              <a:schemeClr val="bg1"/>
+                            </a:solidFill>
+                          </a:rPr>
+                          <m:t>𝑖</m:t>
+                        </m:r>
+                      </m:e>
+                      <m:sub>
+                        <m:r>
+                          <a:rPr lang="ru-RU" sz="2000" i="1">
+                            <a:solidFill>
+                              <a:schemeClr val="bg1"/>
+                            </a:solidFill>
+                          </a:rPr>
+                          <m:t>1</m:t>
+                        </m:r>
+                      </m:sub>
+                    </m:sSub>
+                    <m:r>
+                      <a:rPr lang="ru-RU" sz="2000" i="1">
+                        <a:solidFill>
+                          <a:schemeClr val="bg1"/>
+                        </a:solidFill>
+                      </a:rPr>
+                      <m:t>][</m:t>
+                    </m:r>
+                    <m:sSub>
+                      <m:sSubPr>
+                        <m:ctrlPr>
+                          <a:rPr lang="ru-RU" sz="2000" i="1">
+                            <a:solidFill>
+                              <a:schemeClr val="bg1"/>
+                            </a:solidFill>
+                          </a:rPr>
+                        </m:ctrlPr>
+                      </m:sSubPr>
+                      <m:e>
+                        <m:r>
+                          <a:rPr lang="ru-RU" sz="2000" i="1">
+                            <a:solidFill>
+                              <a:schemeClr val="bg1"/>
+                            </a:solidFill>
+                          </a:rPr>
+                          <m:t>𝑖</m:t>
+                        </m:r>
+                      </m:e>
+                      <m:sub>
+                        <m:r>
+                          <a:rPr lang="ru-RU" sz="2000" i="1">
+                            <a:solidFill>
+                              <a:schemeClr val="bg1"/>
+                            </a:solidFill>
+                          </a:rPr>
+                          <m:t>2</m:t>
+                        </m:r>
+                      </m:sub>
+                    </m:sSub>
+                    <m:r>
+                      <a:rPr lang="ru-RU" sz="2000" i="1">
+                        <a:solidFill>
+                          <a:schemeClr val="bg1"/>
+                        </a:solidFill>
+                      </a:rPr>
+                      <m:t>]...[</m:t>
+                    </m:r>
+                    <m:sSub>
+                      <m:sSubPr>
+                        <m:ctrlPr>
+                          <a:rPr lang="ru-RU" sz="2000" i="1">
+                            <a:solidFill>
+                              <a:schemeClr val="bg1"/>
+                            </a:solidFill>
+                          </a:rPr>
+                        </m:ctrlPr>
+                      </m:sSubPr>
+                      <m:e>
+                        <m:r>
+                          <a:rPr lang="ru-RU" sz="2000" i="1">
+                            <a:solidFill>
+                              <a:schemeClr val="bg1"/>
+                            </a:solidFill>
+                          </a:rPr>
+                          <m:t>𝑖</m:t>
+                        </m:r>
+                      </m:e>
+                      <m:sub>
+                        <m:r>
+                          <a:rPr lang="ru-RU" sz="2000" i="1">
+                            <a:solidFill>
+                              <a:schemeClr val="bg1"/>
+                            </a:solidFill>
+                          </a:rPr>
+                          <m:t>𝑛</m:t>
+                        </m:r>
+                      </m:sub>
+                    </m:sSub>
+                    <m:r>
+                      <a:rPr lang="ru-RU" sz="2000" i="1">
+                        <a:solidFill>
+                          <a:schemeClr val="bg1"/>
+                        </a:solidFill>
+                      </a:rPr>
+                      <m:t>]</m:t>
+                    </m:r>
+                  </m:oMath>
+                </a14:m>
+                <a:r>
+                  <a:rPr lang="ru-RU" sz="2000" dirty="0">
+                    <a:solidFill>
+                      <a:schemeClr val="bg1"/>
+                    </a:solidFill>
+                  </a:rPr>
+                  <a:t> </a:t>
+                </a:r>
+                <a:r>
+                  <a:rPr lang="ru-RU" sz="2000" dirty="0" smtClean="0">
+                    <a:solidFill>
+                      <a:schemeClr val="bg1"/>
+                    </a:solidFill>
+                  </a:rPr>
+                  <a:t>вместо массива подставляется переменная по адресу </a:t>
+                </a:r>
+                <a14:m>
+                  <m:oMath xmlns:m="http://schemas.openxmlformats.org/officeDocument/2006/math">
+                    <m:r>
+                      <a:rPr lang="ru-RU" sz="2000" i="1" smtClean="0">
+                        <a:solidFill>
+                          <a:schemeClr val="bg1"/>
+                        </a:solidFill>
+                      </a:rPr>
+                      <m:t>𝑚𝑎𝑠</m:t>
+                    </m:r>
+                    <m:r>
+                      <a:rPr lang="ru-RU" sz="2000" i="1" smtClean="0">
+                        <a:solidFill>
+                          <a:schemeClr val="bg1"/>
+                        </a:solidFill>
+                      </a:rPr>
+                      <m:t> + </m:t>
+                    </m:r>
+                    <m:r>
+                      <a:rPr lang="ru-RU" sz="2000" i="1" smtClean="0">
+                        <a:solidFill>
+                          <a:schemeClr val="bg1"/>
+                        </a:solidFill>
+                      </a:rPr>
+                      <m:t>𝑠h𝑖𝑓𝑡</m:t>
+                    </m:r>
+                  </m:oMath>
+                </a14:m>
+                <a:endParaRPr lang="ru-RU" sz="2000" u="none" strike="noStrike" cap="none" spc="0" dirty="0" smtClean="0">
+                  <a:solidFill>
+                    <a:schemeClr val="bg1"/>
+                  </a:solidFill>
+                  <a:latin typeface="Calibri"/>
+                </a:endParaRPr>
+              </a:p>
+              <a:p>
+                <a:pPr marL="342900" lvl="0" indent="-342900" fontAlgn="base">
+                  <a:buFont typeface="Arial" panose="020B0604020202020204" pitchFamily="34" charset="0"/>
+                  <a:buChar char="•"/>
+                </a:pPr>
+                <a:endParaRPr lang="en-US" sz="2000" u="none" strike="noStrike" cap="none" spc="0" dirty="0" smtClean="0">
+                  <a:solidFill>
+                    <a:schemeClr val="bg1"/>
+                  </a:solidFill>
+                  <a:latin typeface="Calibri"/>
+                </a:endParaRPr>
+              </a:p>
+              <a:p>
+                <a:pPr marL="342900" lvl="0" indent="-342900" fontAlgn="base">
+                  <a:buFont typeface="Arial" panose="020B0604020202020204" pitchFamily="34" charset="0"/>
+                  <a:buChar char="•"/>
+                </a:pPr>
+                <a:r>
+                  <a:rPr lang="ru-RU" sz="2000" u="none" strike="noStrike" cap="none" spc="0" dirty="0" smtClean="0">
+                    <a:solidFill>
+                      <a:schemeClr val="bg1"/>
+                    </a:solidFill>
+                    <a:latin typeface="Calibri"/>
+                  </a:rPr>
+                  <a:t>Сдвиг </a:t>
+                </a:r>
+                <a14:m>
+                  <m:oMath xmlns:m="http://schemas.openxmlformats.org/officeDocument/2006/math">
+                    <m:r>
+                      <a:rPr lang="ru-RU" sz="2000" i="1">
+                        <a:solidFill>
+                          <a:schemeClr val="bg1"/>
+                        </a:solidFill>
+                        <a:latin typeface="Cambria Math" panose="02040503050406030204" pitchFamily="18" charset="0"/>
+                      </a:rPr>
+                      <m:t>𝑠h𝑖𝑓𝑡</m:t>
+                    </m:r>
+                  </m:oMath>
+                </a14:m>
+                <a:r>
+                  <a:rPr lang="en-US" sz="2000" u="none" strike="noStrike" cap="none" spc="0" dirty="0" smtClean="0">
+                    <a:solidFill>
+                      <a:schemeClr val="bg1"/>
+                    </a:solidFill>
+                    <a:latin typeface="Calibri"/>
+                  </a:rPr>
+                  <a:t> </a:t>
+                </a:r>
+                <a:r>
+                  <a:rPr lang="ru-RU" sz="2000" u="none" strike="noStrike" cap="none" spc="0" dirty="0" smtClean="0">
+                    <a:solidFill>
+                      <a:schemeClr val="bg1"/>
+                    </a:solidFill>
+                    <a:latin typeface="Calibri"/>
+                  </a:rPr>
+                  <a:t>вычисляется рекурсивно по формуле:</a:t>
+                </a:r>
+                <a:br>
+                  <a:rPr lang="ru-RU" sz="2000" u="none" strike="noStrike" cap="none" spc="0" dirty="0" smtClean="0">
+                    <a:solidFill>
+                      <a:schemeClr val="bg1"/>
+                    </a:solidFill>
+                    <a:latin typeface="Calibri"/>
+                  </a:rPr>
+                </a:br>
+                <a14:m>
+                  <m:oMath xmlns:m="http://schemas.openxmlformats.org/officeDocument/2006/math">
+                    <m:sSub>
+                      <m:sSubPr>
+                        <m:ctrlPr>
+                          <a:rPr lang="ru-RU" sz="2000" i="1" smtClean="0">
+                            <a:solidFill>
+                              <a:schemeClr val="bg1"/>
+                            </a:solidFill>
+                          </a:rPr>
+                        </m:ctrlPr>
+                      </m:sSubPr>
+                      <m:e>
+                        <m:r>
+                          <a:rPr lang="ru-RU" sz="2000" i="1">
+                            <a:solidFill>
+                              <a:schemeClr val="bg1"/>
+                            </a:solidFill>
+                          </a:rPr>
+                          <m:t>𝑠h𝑖𝑓𝑡</m:t>
+                        </m:r>
+                      </m:e>
+                      <m:sub>
+                        <m:r>
+                          <a:rPr lang="ru-RU" sz="2000" i="1">
+                            <a:solidFill>
+                              <a:schemeClr val="bg1"/>
+                            </a:solidFill>
+                          </a:rPr>
+                          <m:t>𝑛</m:t>
+                        </m:r>
+                      </m:sub>
+                    </m:sSub>
+                    <m:r>
+                      <a:rPr lang="ru-RU" sz="2000" i="1">
+                        <a:solidFill>
+                          <a:schemeClr val="bg1"/>
+                        </a:solidFill>
+                      </a:rPr>
+                      <m:t>= </m:t>
+                    </m:r>
+                    <m:sSub>
+                      <m:sSubPr>
+                        <m:ctrlPr>
+                          <a:rPr lang="ru-RU" sz="2000" i="1">
+                            <a:solidFill>
+                              <a:schemeClr val="bg1"/>
+                            </a:solidFill>
+                          </a:rPr>
+                        </m:ctrlPr>
+                      </m:sSubPr>
+                      <m:e>
+                        <m:r>
+                          <a:rPr lang="ru-RU" sz="2000" i="1">
+                            <a:solidFill>
+                              <a:schemeClr val="bg1"/>
+                            </a:solidFill>
+                          </a:rPr>
+                          <m:t>𝑖</m:t>
+                        </m:r>
+                      </m:e>
+                      <m:sub>
+                        <m:r>
+                          <a:rPr lang="ru-RU" sz="2000" i="1">
+                            <a:solidFill>
+                              <a:schemeClr val="bg1"/>
+                            </a:solidFill>
+                          </a:rPr>
+                          <m:t>𝑛</m:t>
+                        </m:r>
+                      </m:sub>
+                    </m:sSub>
+                    <m:r>
+                      <a:rPr lang="ru-RU" sz="2000" i="1">
+                        <a:solidFill>
+                          <a:schemeClr val="bg1"/>
+                        </a:solidFill>
+                      </a:rPr>
+                      <m:t>+ </m:t>
+                    </m:r>
+                    <m:sSub>
+                      <m:sSubPr>
+                        <m:ctrlPr>
+                          <a:rPr lang="ru-RU" sz="2000" i="1">
+                            <a:solidFill>
+                              <a:schemeClr val="bg1"/>
+                            </a:solidFill>
+                          </a:rPr>
+                        </m:ctrlPr>
+                      </m:sSubPr>
+                      <m:e>
+                        <m:r>
+                          <a:rPr lang="en-US" sz="2000" i="1">
+                            <a:solidFill>
+                              <a:schemeClr val="bg1"/>
+                            </a:solidFill>
+                          </a:rPr>
+                          <m:t>𝑘</m:t>
+                        </m:r>
+                      </m:e>
+                      <m:sub>
+                        <m:r>
+                          <a:rPr lang="ru-RU" sz="2000" i="1">
+                            <a:solidFill>
+                              <a:schemeClr val="bg1"/>
+                            </a:solidFill>
+                          </a:rPr>
+                          <m:t>𝑛</m:t>
+                        </m:r>
+                      </m:sub>
+                    </m:sSub>
+                    <m:r>
+                      <a:rPr lang="ru-RU" sz="2000" i="1">
+                        <a:solidFill>
+                          <a:schemeClr val="bg1"/>
+                        </a:solidFill>
+                      </a:rPr>
+                      <m:t>∗</m:t>
+                    </m:r>
+                    <m:sSub>
+                      <m:sSubPr>
+                        <m:ctrlPr>
+                          <a:rPr lang="ru-RU" sz="2000" i="1">
+                            <a:solidFill>
+                              <a:schemeClr val="bg1"/>
+                            </a:solidFill>
+                          </a:rPr>
+                        </m:ctrlPr>
+                      </m:sSubPr>
+                      <m:e>
+                        <m:r>
+                          <a:rPr lang="ru-RU" sz="2000" i="1">
+                            <a:solidFill>
+                              <a:schemeClr val="bg1"/>
+                            </a:solidFill>
+                          </a:rPr>
+                          <m:t>𝑠h𝑖𝑓𝑡</m:t>
+                        </m:r>
+                      </m:e>
+                      <m:sub>
+                        <m:r>
+                          <a:rPr lang="ru-RU" sz="2000" i="1">
+                            <a:solidFill>
+                              <a:schemeClr val="bg1"/>
+                            </a:solidFill>
+                          </a:rPr>
+                          <m:t>𝑛</m:t>
+                        </m:r>
+                        <m:r>
+                          <a:rPr lang="ru-RU" sz="2000" i="1">
+                            <a:solidFill>
+                              <a:schemeClr val="bg1"/>
+                            </a:solidFill>
+                          </a:rPr>
+                          <m:t>−1</m:t>
+                        </m:r>
+                      </m:sub>
+                    </m:sSub>
+                  </m:oMath>
+                </a14:m>
+                <a:endParaRPr lang="ru-RU" sz="2000" u="none" strike="noStrike" cap="none" spc="0" dirty="0" smtClean="0">
+                  <a:solidFill>
+                    <a:schemeClr val="bg1"/>
+                  </a:solidFill>
+                  <a:latin typeface="Calibri"/>
+                </a:endParaRPr>
+              </a:p>
+              <a:p>
+                <a:pPr marL="342900" marR="0" lvl="0" indent="-342900" algn="l" rtl="0" fontAlgn="base">
+                  <a:lnSpc>
+                    <a:spcPct val="100000"/>
+                  </a:lnSpc>
+                  <a:spcBef>
+                    <a:spcPts val="0"/>
+                  </a:spcBef>
+                  <a:spcAft>
+                    <a:spcPts val="0"/>
+                  </a:spcAft>
+                  <a:buFont typeface="Arial" panose="020B0604020202020204" pitchFamily="34" charset="0"/>
+                  <a:buChar char="•"/>
+                </a:pPr>
+                <a:endParaRPr lang="en-US" sz="2000" u="none" strike="noStrike" cap="none" spc="0" dirty="0">
+                  <a:solidFill>
+                    <a:srgbClr val="FFFFFF">
+                      <a:alpha val="100000"/>
+                    </a:srgbClr>
+                  </a:solidFill>
+                  <a:latin typeface="Calibri"/>
+                </a:endParaRPr>
+              </a:p>
+            </p:txBody>
+          </p:sp>
+        </mc:Choice>
+        <mc:Fallback>
+          <p:sp>
+            <p:nvSpPr>
+              <p:cNvPr id="3" name="TextBox 2"/>
+              <p:cNvSpPr txBox="1">
+                <a:spLocks noRot="1" noChangeAspect="1" noMove="1" noResize="1" noEditPoints="1" noAdjustHandles="1" noChangeArrowheads="1" noChangeShapeType="1" noTextEdit="1"/>
+              </p:cNvSpPr>
+              <p:nvPr/>
+            </p:nvSpPr>
+            <p:spPr>
+              <a:xfrm>
+                <a:off x="914400" y="1800225"/>
+                <a:ext cx="7315200" cy="2862322"/>
+              </a:xfrm>
+              <a:prstGeom prst="rect">
+                <a:avLst/>
+              </a:prstGeom>
+              <a:blipFill>
+                <a:blip r:embed="rId2"/>
+                <a:stretch>
+                  <a:fillRect l="-750" t="-1064"/>
+                </a:stretch>
+              </a:blipFill>
+            </p:spPr>
+            <p:txBody>
+              <a:bodyPr/>
+              <a:lstStyle/>
+              <a:p>
+                <a:r>
+                  <a:rPr lang="ru-RU">
+                    <a:noFill/>
+                  </a:rPr>
+                  <a:t> </a:t>
+                </a:r>
+              </a:p>
+            </p:txBody>
+          </p:sp>
+        </mc:Fallback>
+      </mc:AlternateContent>
     </p:spTree>
   </p:cSld>
   <p:clrMapOvr>

</xml_diff>